<commit_message>
add IPAC logo and as a sponsor
</commit_message>
<xml_diff>
--- a/website/assets/static/media/slides/Logos.pptx
+++ b/website/assets/static/media/slides/Logos.pptx
@@ -2991,7 +2991,7 @@
           </a:ln>
           <a:extLst>
             <a:ext uri="{C572A759-6A51-4108-AA02-DFA0A04FC94B}">
-              <ma14:wrappingTextBoxFlag xmlns:ma14="http://schemas.microsoft.com/office/mac/drawingml/2011/main" xmlns:a14="http://schemas.microsoft.com/office/drawing/2010/main" xmlns:m="http://schemas.openxmlformats.org/officeDocument/2006/math" xmlns="" val="1"/>
+              <ma14:wrappingTextBoxFlag xmlns="" xmlns:m="http://schemas.openxmlformats.org/officeDocument/2006/math" xmlns:a14="http://schemas.microsoft.com/office/drawing/2010/main" xmlns:ma14="http://schemas.microsoft.com/office/mac/drawingml/2011/main" val="1"/>
             </a:ext>
           </a:extLst>
         </p:spPr>
@@ -3030,7 +3030,7 @@
           </a:ln>
           <a:extLst>
             <a:ext uri="{C572A759-6A51-4108-AA02-DFA0A04FC94B}">
-              <ma14:wrappingTextBoxFlag xmlns:ma14="http://schemas.microsoft.com/office/mac/drawingml/2011/main" xmlns:a14="http://schemas.microsoft.com/office/drawing/2010/main" xmlns:m="http://schemas.openxmlformats.org/officeDocument/2006/math" xmlns="" val="1"/>
+              <ma14:wrappingTextBoxFlag xmlns="" xmlns:m="http://schemas.openxmlformats.org/officeDocument/2006/math" xmlns:a14="http://schemas.microsoft.com/office/drawing/2010/main" xmlns:ma14="http://schemas.microsoft.com/office/mac/drawingml/2011/main" val="1"/>
             </a:ext>
           </a:extLst>
         </p:spPr>
@@ -3921,7 +3921,7 @@
         </p:blipFill>
         <p:spPr>
           <a:xfrm>
-            <a:off x="4141726" y="10501735"/>
+            <a:off x="1941850" y="10215165"/>
             <a:ext cx="2693149" cy="2693149"/>
           </a:xfrm>
           <a:prstGeom prst="rect">
@@ -3957,7 +3957,7 @@
         </p:blipFill>
         <p:spPr>
           <a:xfrm>
-            <a:off x="18279139" y="6529484"/>
+            <a:off x="17806851" y="6516728"/>
             <a:ext cx="4535533" cy="3216896"/>
           </a:xfrm>
           <a:prstGeom prst="rect">
@@ -4003,7 +4003,7 @@
         </p:blipFill>
         <p:spPr>
           <a:xfrm>
-            <a:off x="16214260" y="3231359"/>
+            <a:off x="16060931" y="3293771"/>
             <a:ext cx="3185183" cy="3197340"/>
           </a:xfrm>
           <a:prstGeom prst="rect">
@@ -4039,7 +4039,7 @@
         </p:blipFill>
         <p:spPr>
           <a:xfrm>
-            <a:off x="16418317" y="9393213"/>
+            <a:off x="12387708" y="9214838"/>
             <a:ext cx="4709305" cy="4709305"/>
           </a:xfrm>
           <a:prstGeom prst="rect">
@@ -4259,7 +4259,7 @@
         </p:blipFill>
         <p:spPr>
           <a:xfrm>
-            <a:off x="8590118" y="11074305"/>
+            <a:off x="5590970" y="10787735"/>
             <a:ext cx="6072955" cy="1548008"/>
           </a:xfrm>
           <a:prstGeom prst="rect">
@@ -4331,7 +4331,7 @@
         </p:blipFill>
         <p:spPr>
           <a:xfrm>
-            <a:off x="2787345" y="6529484"/>
+            <a:off x="2265006" y="6516728"/>
             <a:ext cx="2286298" cy="2982128"/>
           </a:xfrm>
           <a:prstGeom prst="rect">
@@ -4377,7 +4377,7 @@
         </p:blipFill>
         <p:spPr>
           <a:xfrm>
-            <a:off x="6076640" y="6668386"/>
+            <a:off x="5020940" y="6695024"/>
             <a:ext cx="6512109" cy="3231573"/>
           </a:xfrm>
           <a:prstGeom prst="rect">
@@ -4423,8 +4423,44 @@
         </p:blipFill>
         <p:spPr>
           <a:xfrm>
-            <a:off x="12478477" y="7144308"/>
+            <a:off x="11494691" y="7219330"/>
             <a:ext cx="5116510" cy="1944274"/>
+          </a:xfrm>
+          <a:prstGeom prst="rect">
+            <a:avLst/>
+          </a:prstGeom>
+        </p:spPr>
+      </p:pic>
+      <p:pic>
+        <p:nvPicPr>
+          <p:cNvPr id="4" name="Imagen 3">
+            <a:extLst>
+              <a:ext uri="{FF2B5EF4-FFF2-40B4-BE49-F238E27FC236}">
+                <a16:creationId xmlns:a16="http://schemas.microsoft.com/office/drawing/2014/main" id="{25CDF7E8-6AE3-3E46-95E9-C28FC7F96C43}"/>
+              </a:ext>
+            </a:extLst>
+          </p:cNvPr>
+          <p:cNvPicPr>
+            <a:picLocks noChangeAspect="1"/>
+          </p:cNvPicPr>
+          <p:nvPr/>
+        </p:nvPicPr>
+        <p:blipFill>
+          <a:blip r:embed="rId14">
+            <a:extLst>
+              <a:ext uri="{28A0092B-C50C-407E-A947-70E740481C1C}">
+                <a14:useLocalDpi xmlns:a14="http://schemas.microsoft.com/office/drawing/2010/main" val="0"/>
+              </a:ext>
+            </a:extLst>
+          </a:blip>
+          <a:stretch>
+            <a:fillRect/>
+          </a:stretch>
+        </p:blipFill>
+        <p:spPr>
+          <a:xfrm>
+            <a:off x="18149607" y="10181695"/>
+            <a:ext cx="4762500" cy="2552700"/>
           </a:xfrm>
           <a:prstGeom prst="rect">
             <a:avLst/>

</xml_diff>